<commit_message>
Adding the router Samples
</commit_message>
<xml_diff>
--- a/materials/AngularJS.pptx
+++ b/materials/AngularJS.pptx
@@ -4979,9 +4979,27 @@
             </a:r>
             <a:r>
               <a:rPr lang="en-US" dirty="0" smtClean="0"/>
-              <a:t>include it in your route path</a:t>
-            </a:r>
-            <a:endParaRPr lang="en-US" dirty="0"/>
+              <a:t>include it in your route </a:t>
+            </a:r>
+            <a:r>
+              <a:rPr lang="en-US" dirty="0" smtClean="0"/>
+              <a:t>path</a:t>
+            </a:r>
+          </a:p>
+          <a:p>
+            <a:r>
+              <a:rPr lang="en-US" dirty="0">
+                <a:hlinkClick r:id="rId2"/>
+              </a:rPr>
+              <a:t>http://localhost:9080/Routing/Samples/NgRouteLocation</a:t>
+            </a:r>
+            <a:r>
+              <a:rPr lang="en-US" dirty="0" smtClean="0">
+                <a:hlinkClick r:id="rId2"/>
+              </a:rPr>
+              <a:t>/</a:t>
+            </a:r>
+            <a:endParaRPr lang="en-US" dirty="0" smtClean="0"/>
           </a:p>
         </p:txBody>
       </p:sp>
@@ -5083,7 +5101,76 @@
           <a:bodyPr/>
           <a:lstStyle/>
           <a:p>
-            <a:endParaRPr lang="en-US"/>
+            <a:r>
+              <a:rPr lang="en-US" dirty="0">
+                <a:hlinkClick r:id="rId2"/>
+              </a:rPr>
+              <a:t>http://</a:t>
+            </a:r>
+            <a:r>
+              <a:rPr lang="en-US" dirty="0" smtClean="0">
+                <a:hlinkClick r:id="rId2"/>
+              </a:rPr>
+              <a:t>localhost:9080/Routing/Exercises/NgRouteLocation/</a:t>
+            </a:r>
+            <a:endParaRPr lang="en-US" dirty="0" smtClean="0"/>
+          </a:p>
+          <a:p>
+            <a:pPr lvl="1"/>
+            <a:r>
+              <a:rPr lang="en-US" dirty="0" smtClean="0"/>
+              <a:t>Source: /</a:t>
+            </a:r>
+            <a:r>
+              <a:rPr lang="en-US" dirty="0" err="1" smtClean="0"/>
+              <a:t>AngularClass</a:t>
+            </a:r>
+            <a:r>
+              <a:rPr lang="en-US" dirty="0" smtClean="0"/>
+              <a:t>/Routing/Exercises/</a:t>
+            </a:r>
+            <a:r>
+              <a:rPr lang="en-US" dirty="0" err="1" smtClean="0"/>
+              <a:t>NgRouteLocation</a:t>
+            </a:r>
+            <a:endParaRPr lang="en-US" dirty="0" smtClean="0"/>
+          </a:p>
+          <a:p>
+            <a:endParaRPr lang="en-US" dirty="0"/>
+          </a:p>
+          <a:p>
+            <a:r>
+              <a:rPr lang="en-US" dirty="0"/>
+              <a:t>In this Lab, you should do the following:</a:t>
+            </a:r>
+          </a:p>
+          <a:p>
+            <a:pPr lvl="1"/>
+            <a:r>
+              <a:rPr lang="en-US" dirty="0" smtClean="0"/>
+              <a:t>You will refactor your previous lab to move using the $location variable as opposed to the </a:t>
+            </a:r>
+            <a:r>
+              <a:rPr lang="en-US" dirty="0" err="1" smtClean="0"/>
+              <a:t>href</a:t>
+            </a:r>
+            <a:r>
+              <a:rPr lang="en-US" dirty="0" smtClean="0"/>
+              <a:t> tags</a:t>
+            </a:r>
+            <a:endParaRPr lang="en-US" dirty="0"/>
+          </a:p>
+          <a:p>
+            <a:endParaRPr lang="en-US" dirty="0"/>
+          </a:p>
+          <a:p>
+            <a:endParaRPr lang="en-US" dirty="0"/>
+          </a:p>
+          <a:p>
+            <a:endParaRPr lang="en-US" dirty="0" smtClean="0"/>
+          </a:p>
+          <a:p>
+            <a:endParaRPr lang="en-US" dirty="0"/>
           </a:p>
         </p:txBody>
       </p:sp>
@@ -5421,8 +5508,34 @@
             <a:pPr lvl="1"/>
             <a:r>
               <a:rPr lang="en-US" dirty="0" smtClean="0"/>
-              <a:t>This enables Angular to properly resolve your URLs.</a:t>
-            </a:r>
+              <a:t>This enables Angular to properly resolve </a:t>
+            </a:r>
+            <a:r>
+              <a:rPr lang="en-US" smtClean="0"/>
+              <a:t>your </a:t>
+            </a:r>
+            <a:r>
+              <a:rPr lang="en-US" smtClean="0"/>
+              <a:t>URLs.</a:t>
+            </a:r>
+            <a:endParaRPr lang="en-US" dirty="0" smtClean="0"/>
+          </a:p>
+          <a:p>
+            <a:r>
+              <a:rPr lang="en-US" dirty="0">
+                <a:hlinkClick r:id="rId2"/>
+              </a:rPr>
+              <a:t>http://localhost:9080/Routing/Samples/NgRouteNoHash</a:t>
+            </a:r>
+            <a:r>
+              <a:rPr lang="en-US" dirty="0" smtClean="0">
+                <a:hlinkClick r:id="rId2"/>
+              </a:rPr>
+              <a:t>/</a:t>
+            </a:r>
+            <a:endParaRPr lang="en-US" dirty="0" smtClean="0"/>
+          </a:p>
+          <a:p>
             <a:endParaRPr lang="en-US" dirty="0"/>
           </a:p>
         </p:txBody>
@@ -48646,12 +48759,11 @@
             <a:pPr lvl="1"/>
             <a:r>
               <a:rPr lang="en-US" dirty="0" smtClean="0"/>
-              <a:t>Create test cases to cover the various use cases for both your local filter and </a:t>
-            </a:r>
-            <a:r>
-              <a:rPr lang="en-US" smtClean="0"/>
-              <a:t>your reusable filter (the one’s you created in the last two labs)</a:t>
-            </a:r>
+              <a:t>Create test cases to cover the various use cases for both your local filter and your reusable filter (the one’s you created in the last two labs)</a:t>
+            </a:r>
+            <a:endParaRPr lang="en-US" dirty="0"/>
+          </a:p>
+          <a:p>
             <a:endParaRPr lang="en-US" dirty="0"/>
           </a:p>
           <a:p>
@@ -50516,7 +50628,11 @@
             </a:r>
             <a:r>
               <a:rPr lang="en-US" b="1" dirty="0" smtClean="0"/>
-              <a:t>”, “$</a:t>
+              <a:t>”, </a:t>
+            </a:r>
+            <a:r>
+              <a:rPr lang="en-US" b="1" dirty="0" smtClean="0"/>
+              <a:t>“$</a:t>
             </a:r>
             <a:r>
               <a:rPr lang="en-US" b="1" dirty="0" err="1" smtClean="0"/>
@@ -50582,7 +50698,7 @@
               <a:buNone/>
             </a:pPr>
             <a:r>
-              <a:rPr lang="en-US" b="1" dirty="0"/>
+              <a:rPr lang="en-US" b="1" dirty="0" smtClean="0"/>
               <a:t>});</a:t>
             </a:r>
           </a:p>
@@ -50590,15 +50706,33 @@
             <a:pPr marL="292608" lvl="1" indent="0">
               <a:buNone/>
             </a:pPr>
+            <a:endParaRPr lang="en-US" b="1" dirty="0">
+              <a:hlinkClick r:id="rId2"/>
+            </a:endParaRPr>
+          </a:p>
+          <a:p>
+            <a:pPr marL="292608" lvl="1" indent="0">
+              <a:buNone/>
+            </a:pPr>
+            <a:r>
+              <a:rPr lang="en-US" dirty="0" smtClean="0">
+                <a:hlinkClick r:id="rId2"/>
+              </a:rPr>
+              <a:t>http</a:t>
+            </a:r>
+            <a:r>
+              <a:rPr lang="en-US" dirty="0">
+                <a:hlinkClick r:id="rId2"/>
+              </a:rPr>
+              <a:t>://</a:t>
+            </a:r>
+            <a:r>
+              <a:rPr lang="en-US" dirty="0" smtClean="0">
+                <a:hlinkClick r:id="rId2"/>
+              </a:rPr>
+              <a:t>localhost:9080/Routing/Samples/NgRoute</a:t>
+            </a:r>
             <a:endParaRPr lang="en-US" dirty="0" smtClean="0"/>
-          </a:p>
-          <a:p>
-            <a:pPr lvl="1"/>
-            <a:r>
-              <a:rPr lang="en-US" dirty="0" smtClean="0"/>
-              <a:t>EXAMPLE</a:t>
-            </a:r>
-            <a:endParaRPr lang="en-US" dirty="0"/>
           </a:p>
         </p:txBody>
       </p:sp>
@@ -50699,6 +50833,93 @@
         <p:txBody>
           <a:bodyPr/>
           <a:lstStyle/>
+          <a:p>
+            <a:r>
+              <a:rPr lang="en-US" dirty="0" smtClean="0">
+                <a:hlinkClick r:id="rId2"/>
+              </a:rPr>
+              <a:t>http</a:t>
+            </a:r>
+            <a:r>
+              <a:rPr lang="en-US" dirty="0">
+                <a:hlinkClick r:id="rId2"/>
+              </a:rPr>
+              <a:t>://localhost:9080/Routing/Exercises/NgRoute</a:t>
+            </a:r>
+            <a:r>
+              <a:rPr lang="en-US" dirty="0" smtClean="0">
+                <a:hlinkClick r:id="rId2"/>
+              </a:rPr>
+              <a:t>/</a:t>
+            </a:r>
+            <a:endParaRPr lang="en-US" dirty="0"/>
+          </a:p>
+          <a:p>
+            <a:pPr lvl="1"/>
+            <a:r>
+              <a:rPr lang="en-US" dirty="0"/>
+              <a:t>Source: /</a:t>
+            </a:r>
+            <a:r>
+              <a:rPr lang="en-US" dirty="0" err="1" smtClean="0"/>
+              <a:t>AngularClass</a:t>
+            </a:r>
+            <a:r>
+              <a:rPr lang="en-US" dirty="0" smtClean="0"/>
+              <a:t>/Routing/Exercises/</a:t>
+            </a:r>
+            <a:r>
+              <a:rPr lang="en-US" dirty="0" err="1" smtClean="0"/>
+              <a:t>NgRoute</a:t>
+            </a:r>
+            <a:endParaRPr lang="en-US" dirty="0" smtClean="0"/>
+          </a:p>
+          <a:p>
+            <a:endParaRPr lang="en-US" dirty="0" smtClean="0"/>
+          </a:p>
+          <a:p>
+            <a:r>
+              <a:rPr lang="en-US" dirty="0" smtClean="0"/>
+              <a:t>In this Lab, you should do the following:</a:t>
+            </a:r>
+          </a:p>
+          <a:p>
+            <a:pPr lvl="1"/>
+            <a:r>
+              <a:rPr lang="en-US" dirty="0" smtClean="0"/>
+              <a:t>You will need to setup the route configuration in your main app module</a:t>
+            </a:r>
+            <a:endParaRPr lang="en-US" dirty="0"/>
+          </a:p>
+          <a:p>
+            <a:pPr lvl="1"/>
+            <a:r>
+              <a:rPr lang="en-US" dirty="0"/>
+              <a:t>In your controller you will need to add a module dependency to your filter module</a:t>
+            </a:r>
+          </a:p>
+          <a:p>
+            <a:pPr lvl="1"/>
+            <a:r>
+              <a:rPr lang="en-US" dirty="0" smtClean="0"/>
+              <a:t>Fill in your templates for your List and Detail Pages</a:t>
+            </a:r>
+          </a:p>
+          <a:p>
+            <a:pPr lvl="1"/>
+            <a:r>
+              <a:rPr lang="en-US" dirty="0" smtClean="0"/>
+              <a:t>Wire your index view up to work with </a:t>
+            </a:r>
+            <a:r>
+              <a:rPr lang="en-US" dirty="0" err="1" smtClean="0"/>
+              <a:t>ngRoute</a:t>
+            </a:r>
+            <a:endParaRPr lang="en-US" dirty="0"/>
+          </a:p>
+          <a:p>
+            <a:endParaRPr lang="en-US" dirty="0"/>
+          </a:p>
           <a:p>
             <a:endParaRPr lang="en-US" dirty="0"/>
           </a:p>

</xml_diff>

<commit_message>
Added examples for Factories and Services
</commit_message>
<xml_diff>
--- a/materials/AngularJS.pptx
+++ b/materials/AngularJS.pptx
@@ -976,6 +976,90 @@
 </file>
 
 <file path=ppt/notesSlides/notesSlide2.xml><?xml version="1.0" encoding="utf-8"?>
+<p:notes xmlns:a="http://schemas.openxmlformats.org/drawingml/2006/main" xmlns:r="http://schemas.openxmlformats.org/officeDocument/2006/relationships" xmlns:p="http://schemas.openxmlformats.org/presentationml/2006/main">
+  <p:cSld>
+    <p:spTree>
+      <p:nvGrpSpPr>
+        <p:cNvPr id="1" name=""/>
+        <p:cNvGrpSpPr/>
+        <p:nvPr/>
+      </p:nvGrpSpPr>
+      <p:grpSpPr>
+        <a:xfrm>
+          <a:off x="0" y="0"/>
+          <a:ext cx="0" cy="0"/>
+          <a:chOff x="0" y="0"/>
+          <a:chExt cx="0" cy="0"/>
+        </a:xfrm>
+      </p:grpSpPr>
+      <p:sp>
+        <p:nvSpPr>
+          <p:cNvPr id="2" name="Slide Image Placeholder 1"/>
+          <p:cNvSpPr>
+            <a:spLocks noGrp="1" noRot="1" noChangeAspect="1"/>
+          </p:cNvSpPr>
+          <p:nvPr>
+            <p:ph type="sldImg"/>
+          </p:nvPr>
+        </p:nvSpPr>
+        <p:spPr/>
+      </p:sp>
+      <p:sp>
+        <p:nvSpPr>
+          <p:cNvPr id="3" name="Notes Placeholder 2"/>
+          <p:cNvSpPr>
+            <a:spLocks noGrp="1"/>
+          </p:cNvSpPr>
+          <p:nvPr>
+            <p:ph type="body" idx="1"/>
+          </p:nvPr>
+        </p:nvSpPr>
+        <p:spPr/>
+        <p:txBody>
+          <a:bodyPr/>
+          <a:lstStyle/>
+          <a:p>
+            <a:endParaRPr lang="en-US" dirty="0"/>
+          </a:p>
+        </p:txBody>
+      </p:sp>
+      <p:sp>
+        <p:nvSpPr>
+          <p:cNvPr id="4" name="Slide Number Placeholder 3"/>
+          <p:cNvSpPr>
+            <a:spLocks noGrp="1"/>
+          </p:cNvSpPr>
+          <p:nvPr>
+            <p:ph type="sldNum" sz="quarter" idx="10"/>
+          </p:nvPr>
+        </p:nvSpPr>
+        <p:spPr/>
+        <p:txBody>
+          <a:bodyPr/>
+          <a:lstStyle/>
+          <a:p>
+            <a:fld id="{96E0C481-39FA-644C-9AAA-5FF319C01BC2}" type="slidenum">
+              <a:rPr lang="en-US" smtClean="0"/>
+              <a:t>88</a:t>
+            </a:fld>
+            <a:endParaRPr lang="en-US"/>
+          </a:p>
+        </p:txBody>
+      </p:sp>
+    </p:spTree>
+    <p:extLst>
+      <p:ext uri="{BB962C8B-B14F-4D97-AF65-F5344CB8AC3E}">
+        <p14:creationId xmlns:p14="http://schemas.microsoft.com/office/powerpoint/2010/main" val="835959901"/>
+      </p:ext>
+    </p:extLst>
+  </p:cSld>
+  <p:clrMapOvr>
+    <a:masterClrMapping/>
+  </p:clrMapOvr>
+</p:notes>
+</file>
+
+<file path=ppt/notesSlides/notesSlide3.xml><?xml version="1.0" encoding="utf-8"?>
 <p:notes xmlns:a="http://schemas.openxmlformats.org/drawingml/2006/main" xmlns:r="http://schemas.openxmlformats.org/officeDocument/2006/relationships" xmlns:p="http://schemas.openxmlformats.org/presentationml/2006/main">
   <p:cSld>
     <p:spTree>
@@ -8209,13 +8293,13 @@
               <a:rPr lang="en-US" dirty="0">
                 <a:hlinkClick r:id="rId2"/>
               </a:rPr>
-              <a:t>http://localhost:9080/Routing/Solutions/UIRouter</a:t>
+              <a:t>http://</a:t>
             </a:r>
             <a:r>
               <a:rPr lang="en-US" dirty="0" smtClean="0">
                 <a:hlinkClick r:id="rId2"/>
               </a:rPr>
-              <a:t>/</a:t>
+              <a:t>localhost:9080/Routing/Samples/UIRouter/</a:t>
             </a:r>
             <a:endParaRPr lang="en-US" dirty="0" smtClean="0"/>
           </a:p>
@@ -9094,11 +9178,7 @@
             <a:pPr lvl="1"/>
             <a:r>
               <a:rPr lang="en-US" dirty="0" smtClean="0"/>
-              <a:t>Change your app to use name views for the </a:t>
-            </a:r>
-            <a:r>
-              <a:rPr lang="en-US" smtClean="0"/>
-              <a:t>default state</a:t>
+              <a:t>Change your app to use name views for the default state</a:t>
             </a:r>
             <a:endParaRPr lang="en-US" dirty="0"/>
           </a:p>
@@ -10528,9 +10608,9 @@
         <p:grpSpPr>
           <a:xfrm>
             <a:off x="1097280" y="2707876"/>
-            <a:ext cx="2715491" cy="3415146"/>
+            <a:ext cx="2715490" cy="3415146"/>
             <a:chOff x="1048789" y="2126672"/>
-            <a:chExt cx="2715491" cy="3415146"/>
+            <a:chExt cx="2715490" cy="3415146"/>
           </a:xfrm>
         </p:grpSpPr>
         <p:sp>
@@ -10572,62 +10652,6 @@
               <a:r>
                 <a:rPr lang="en-US" dirty="0" smtClean="0"/>
                 <a:t>main()</a:t>
-              </a:r>
-              <a:endParaRPr lang="en-US" dirty="0"/>
-            </a:p>
-          </p:txBody>
-        </p:sp>
-        <p:sp>
-          <p:nvSpPr>
-            <p:cNvPr id="15" name="Rectangle 14"/>
-            <p:cNvSpPr/>
-            <p:nvPr/>
-          </p:nvSpPr>
-          <p:spPr>
-            <a:xfrm>
-              <a:off x="1201189" y="2583872"/>
-              <a:ext cx="2563091" cy="568037"/>
-            </a:xfrm>
-            <a:prstGeom prst="rect">
-              <a:avLst/>
-            </a:prstGeom>
-          </p:spPr>
-          <p:style>
-            <a:lnRef idx="2">
-              <a:schemeClr val="accent3">
-                <a:shade val="50000"/>
-              </a:schemeClr>
-            </a:lnRef>
-            <a:fillRef idx="1">
-              <a:schemeClr val="accent3"/>
-            </a:fillRef>
-            <a:effectRef idx="0">
-              <a:schemeClr val="accent3"/>
-            </a:effectRef>
-            <a:fontRef idx="minor">
-              <a:schemeClr val="lt1"/>
-            </a:fontRef>
-          </p:style>
-          <p:txBody>
-            <a:bodyPr rtlCol="0" anchor="ctr"/>
-            <a:lstStyle/>
-            <a:p>
-              <a:pPr algn="ctr"/>
-              <a:r>
-                <a:rPr lang="en-US" dirty="0" err="1" smtClean="0"/>
-                <a:t>var</a:t>
-              </a:r>
-              <a:r>
-                <a:rPr lang="en-US" dirty="0" smtClean="0"/>
-                <a:t> deferred = $</a:t>
-              </a:r>
-              <a:r>
-                <a:rPr lang="en-US" dirty="0" err="1" smtClean="0"/>
-                <a:t>q.defer</a:t>
-              </a:r>
-              <a:r>
-                <a:rPr lang="en-US" dirty="0" smtClean="0"/>
-                <a:t>();</a:t>
               </a:r>
               <a:endParaRPr lang="en-US" dirty="0"/>
             </a:p>
@@ -12044,7 +12068,7 @@
         <p:spPr/>
         <p:txBody>
           <a:bodyPr>
-            <a:normAutofit lnSpcReduction="10000"/>
+            <a:normAutofit/>
           </a:bodyPr>
           <a:lstStyle/>
           <a:p>
@@ -12155,22 +12179,6 @@
           </a:p>
           <a:p>
             <a:pPr lvl="1"/>
-            <a:endParaRPr lang="en-US" dirty="0"/>
-          </a:p>
-          <a:p>
-            <a:pPr lvl="1"/>
-            <a:endParaRPr lang="en-US" dirty="0" smtClean="0"/>
-          </a:p>
-          <a:p>
-            <a:pPr lvl="1"/>
-            <a:endParaRPr lang="en-US" dirty="0"/>
-          </a:p>
-          <a:p>
-            <a:pPr lvl="1"/>
-            <a:r>
-              <a:rPr lang="en-US" dirty="0" smtClean="0"/>
-              <a:t>EXAMPLE</a:t>
-            </a:r>
             <a:endParaRPr lang="en-US" dirty="0"/>
           </a:p>
           <a:p>
@@ -12498,6 +12506,27 @@
             <a:endParaRPr lang="en-US" b="1" dirty="0"/>
           </a:p>
           <a:p>
+            <a:endParaRPr lang="en-US" dirty="0" smtClean="0"/>
+          </a:p>
+          <a:p>
+            <a:endParaRPr lang="en-US" dirty="0"/>
+          </a:p>
+          <a:p>
+            <a:r>
+              <a:rPr lang="en-US" dirty="0">
+                <a:hlinkClick r:id="rId2"/>
+              </a:rPr>
+              <a:t>http://localhost:9080/HTTP/Solutions/Basic</a:t>
+            </a:r>
+            <a:r>
+              <a:rPr lang="en-US" dirty="0" smtClean="0">
+                <a:hlinkClick r:id="rId2"/>
+              </a:rPr>
+              <a:t>/</a:t>
+            </a:r>
+            <a:endParaRPr lang="en-US" dirty="0" smtClean="0"/>
+          </a:p>
+          <a:p>
             <a:endParaRPr lang="en-US" dirty="0"/>
           </a:p>
         </p:txBody>
@@ -12600,7 +12629,67 @@
           <a:bodyPr/>
           <a:lstStyle/>
           <a:p>
-            <a:endParaRPr lang="en-US"/>
+            <a:r>
+              <a:rPr lang="en-US" dirty="0">
+                <a:hlinkClick r:id="rId2"/>
+              </a:rPr>
+              <a:t>http://localhost:9080/HTTP/Exercises/Basic</a:t>
+            </a:r>
+            <a:r>
+              <a:rPr lang="en-US" dirty="0" smtClean="0">
+                <a:hlinkClick r:id="rId2"/>
+              </a:rPr>
+              <a:t>/</a:t>
+            </a:r>
+            <a:endParaRPr lang="en-US" dirty="0"/>
+          </a:p>
+          <a:p>
+            <a:r>
+              <a:rPr lang="en-US" dirty="0"/>
+              <a:t>Source: /</a:t>
+            </a:r>
+            <a:r>
+              <a:rPr lang="en-US" dirty="0" err="1" smtClean="0"/>
+              <a:t>AngularClass</a:t>
+            </a:r>
+            <a:r>
+              <a:rPr lang="en-US" dirty="0" smtClean="0"/>
+              <a:t>/HTTP/Exercises/Basic</a:t>
+            </a:r>
+            <a:endParaRPr lang="en-US" dirty="0"/>
+          </a:p>
+          <a:p>
+            <a:endParaRPr lang="en-US" dirty="0"/>
+          </a:p>
+          <a:p>
+            <a:r>
+              <a:rPr lang="en-US" dirty="0"/>
+              <a:t>In this Lab, you should do the following:</a:t>
+            </a:r>
+          </a:p>
+          <a:p>
+            <a:pPr lvl="1"/>
+            <a:r>
+              <a:rPr lang="en-US" dirty="0"/>
+              <a:t>Invoke an HTTP Get to the </a:t>
+            </a:r>
+            <a:r>
+              <a:rPr lang="en-US" dirty="0">
+                <a:hlinkClick r:id="rId3"/>
+              </a:rPr>
+              <a:t>http://</a:t>
+            </a:r>
+            <a:r>
+              <a:rPr lang="en-US" dirty="0" smtClean="0">
+                <a:hlinkClick r:id="rId3"/>
+              </a:rPr>
+              <a:t>localhost:9081/Products</a:t>
+            </a:r>
+            <a:r>
+              <a:rPr lang="en-US" dirty="0" smtClean="0"/>
+              <a:t> endpoint then set that data to a variable to be displayed on the client</a:t>
+            </a:r>
+            <a:endParaRPr lang="en-US" dirty="0"/>
           </a:p>
         </p:txBody>
       </p:sp>
@@ -14394,7 +14483,56 @@
           <a:bodyPr/>
           <a:lstStyle/>
           <a:p>
-            <a:endParaRPr lang="en-US"/>
+            <a:r>
+              <a:rPr lang="en-US" dirty="0" smtClean="0"/>
+              <a:t>Source</a:t>
+            </a:r>
+            <a:r>
+              <a:rPr lang="en-US" dirty="0"/>
+              <a:t>: /</a:t>
+            </a:r>
+            <a:r>
+              <a:rPr lang="en-US" dirty="0" err="1" smtClean="0"/>
+              <a:t>AngularClass</a:t>
+            </a:r>
+            <a:r>
+              <a:rPr lang="en-US" dirty="0" smtClean="0"/>
+              <a:t>/HTTP/Exercises/Testing</a:t>
+            </a:r>
+            <a:endParaRPr lang="en-US" dirty="0"/>
+          </a:p>
+          <a:p>
+            <a:r>
+              <a:rPr lang="en-US" dirty="0"/>
+              <a:t>In this Lab, you should do the following:</a:t>
+            </a:r>
+          </a:p>
+          <a:p>
+            <a:pPr lvl="1"/>
+            <a:r>
+              <a:rPr lang="en-US" dirty="0" smtClean="0"/>
+              <a:t>Setup the HTTP Backend and mock the call to the Product Service that we did from the last exercise</a:t>
+            </a:r>
+          </a:p>
+          <a:p>
+            <a:pPr lvl="1"/>
+            <a:r>
+              <a:rPr lang="en-US" dirty="0" smtClean="0"/>
+              <a:t>You should return a controlled set of data and verify that you are receiving your provided data set</a:t>
+            </a:r>
+            <a:endParaRPr lang="en-US" dirty="0"/>
+          </a:p>
+          <a:p>
+            <a:endParaRPr lang="en-US" dirty="0"/>
+          </a:p>
+          <a:p>
+            <a:endParaRPr lang="en-US" dirty="0"/>
+          </a:p>
+          <a:p>
+            <a:endParaRPr lang="en-US" dirty="0"/>
+          </a:p>
+          <a:p>
+            <a:endParaRPr lang="en-US" dirty="0"/>
           </a:p>
         </p:txBody>
       </p:sp>
@@ -14934,7 +15072,25 @@
             <a:endParaRPr lang="en-US" dirty="0"/>
           </a:p>
           <a:p>
-            <a:endParaRPr lang="en-US" dirty="0"/>
+            <a:endParaRPr lang="en-US" dirty="0" smtClean="0"/>
+          </a:p>
+          <a:p>
+            <a:endParaRPr lang="en-US" dirty="0"/>
+          </a:p>
+          <a:p>
+            <a:r>
+              <a:rPr lang="en-US" dirty="0">
+                <a:hlinkClick r:id="rId2"/>
+              </a:rPr>
+              <a:t>http://localhost:9080/HTTP/Samples/Caching</a:t>
+            </a:r>
+            <a:r>
+              <a:rPr lang="en-US" dirty="0" smtClean="0">
+                <a:hlinkClick r:id="rId2"/>
+              </a:rPr>
+              <a:t>/#/</a:t>
+            </a:r>
+            <a:endParaRPr lang="en-US" dirty="0" smtClean="0"/>
           </a:p>
         </p:txBody>
       </p:sp>
@@ -15036,7 +15192,93 @@
           <a:bodyPr/>
           <a:lstStyle/>
           <a:p>
-            <a:endParaRPr lang="en-US"/>
+            <a:r>
+              <a:rPr lang="en-US" dirty="0">
+                <a:hlinkClick r:id="rId2"/>
+              </a:rPr>
+              <a:t>http://localhost:9080/HTTP/Exercises/Caching</a:t>
+            </a:r>
+            <a:r>
+              <a:rPr lang="en-US" dirty="0" smtClean="0">
+                <a:hlinkClick r:id="rId2"/>
+              </a:rPr>
+              <a:t>/#/</a:t>
+            </a:r>
+            <a:endParaRPr lang="en-US" dirty="0" smtClean="0"/>
+          </a:p>
+          <a:p>
+            <a:r>
+              <a:rPr lang="en-US" dirty="0" smtClean="0"/>
+              <a:t>Source</a:t>
+            </a:r>
+            <a:r>
+              <a:rPr lang="en-US" dirty="0"/>
+              <a:t>: /</a:t>
+            </a:r>
+            <a:r>
+              <a:rPr lang="en-US" dirty="0" err="1" smtClean="0"/>
+              <a:t>AngularClass</a:t>
+            </a:r>
+            <a:r>
+              <a:rPr lang="en-US" dirty="0" smtClean="0"/>
+              <a:t>/HTTP/Exercises/Caching</a:t>
+            </a:r>
+            <a:endParaRPr lang="en-US" dirty="0"/>
+          </a:p>
+          <a:p>
+            <a:endParaRPr lang="en-US" dirty="0"/>
+          </a:p>
+          <a:p>
+            <a:r>
+              <a:rPr lang="en-US" dirty="0"/>
+              <a:t>In this Lab, you should do the following:</a:t>
+            </a:r>
+          </a:p>
+          <a:p>
+            <a:pPr lvl="1"/>
+            <a:r>
+              <a:rPr lang="en-US" dirty="0" smtClean="0"/>
+              <a:t>We will wire our controller up to make a HTTP call to the Products Service</a:t>
+            </a:r>
+          </a:p>
+          <a:p>
+            <a:pPr lvl="2"/>
+            <a:r>
+              <a:rPr lang="en-US" dirty="0" smtClean="0"/>
+              <a:t>One call to get all products</a:t>
+            </a:r>
+          </a:p>
+          <a:p>
+            <a:pPr lvl="2"/>
+            <a:r>
+              <a:rPr lang="en-US" dirty="0" smtClean="0"/>
+              <a:t>One call to get all products by Id</a:t>
+            </a:r>
+          </a:p>
+          <a:p>
+            <a:pPr lvl="1"/>
+            <a:r>
+              <a:rPr lang="en-US" dirty="0" smtClean="0"/>
+              <a:t>Additionally, we want to use caching for each call</a:t>
+            </a:r>
+          </a:p>
+          <a:p>
+            <a:pPr lvl="2"/>
+            <a:r>
+              <a:rPr lang="en-US" dirty="0" smtClean="0"/>
+              <a:t>A custom cache factory for the get by ID call </a:t>
+            </a:r>
+          </a:p>
+          <a:p>
+            <a:pPr lvl="2"/>
+            <a:r>
+              <a:rPr lang="en-US" dirty="0" smtClean="0"/>
+              <a:t>The default cache for the Get All Call</a:t>
+            </a:r>
+            <a:endParaRPr lang="en-US" dirty="0"/>
+          </a:p>
+          <a:p>
+            <a:endParaRPr lang="en-US" dirty="0"/>
           </a:p>
         </p:txBody>
       </p:sp>
@@ -16316,11 +16558,22 @@
             </a:r>
           </a:p>
           <a:p>
+            <a:r>
+              <a:rPr lang="en-US" dirty="0">
+                <a:hlinkClick r:id="rId2"/>
+              </a:rPr>
+              <a:t>http://</a:t>
+            </a:r>
+            <a:r>
+              <a:rPr lang="en-US" dirty="0" smtClean="0">
+                <a:hlinkClick r:id="rId2"/>
+              </a:rPr>
+              <a:t>localhost:9080/HTTP/Samples/NgResource</a:t>
+            </a:r>
+            <a:endParaRPr lang="en-US" dirty="0"/>
+          </a:p>
+          <a:p>
             <a:pPr lvl="1"/>
-            <a:r>
-              <a:rPr lang="en-US" dirty="0" smtClean="0"/>
-              <a:t>Example</a:t>
-            </a:r>
             <a:endParaRPr lang="en-US" dirty="0"/>
           </a:p>
         </p:txBody>
@@ -16423,7 +16676,90 @@
           <a:bodyPr/>
           <a:lstStyle/>
           <a:p>
-            <a:endParaRPr lang="en-US"/>
+            <a:r>
+              <a:rPr lang="en-US" dirty="0">
+                <a:hlinkClick r:id="rId2"/>
+              </a:rPr>
+              <a:t>http://localhost:9080/HTTP/Exercises/NgResource</a:t>
+            </a:r>
+            <a:r>
+              <a:rPr lang="en-US" dirty="0" smtClean="0">
+                <a:hlinkClick r:id="rId2"/>
+              </a:rPr>
+              <a:t>/</a:t>
+            </a:r>
+            <a:endParaRPr lang="en-US" dirty="0" smtClean="0"/>
+          </a:p>
+          <a:p>
+            <a:r>
+              <a:rPr lang="en-US" dirty="0" smtClean="0"/>
+              <a:t>Source: /</a:t>
+            </a:r>
+            <a:r>
+              <a:rPr lang="en-US" dirty="0" err="1" smtClean="0"/>
+              <a:t>AngularClass</a:t>
+            </a:r>
+            <a:r>
+              <a:rPr lang="en-US" dirty="0" smtClean="0"/>
+              <a:t>/HTTP/Exercises/</a:t>
+            </a:r>
+            <a:r>
+              <a:rPr lang="en-US" dirty="0" err="1" smtClean="0"/>
+              <a:t>NgResource</a:t>
+            </a:r>
+            <a:endParaRPr lang="en-US" dirty="0" smtClean="0"/>
+          </a:p>
+          <a:p>
+            <a:endParaRPr lang="en-US" dirty="0" smtClean="0"/>
+          </a:p>
+          <a:p>
+            <a:r>
+              <a:rPr lang="en-US" dirty="0" smtClean="0"/>
+              <a:t>In </a:t>
+            </a:r>
+            <a:r>
+              <a:rPr lang="en-US" dirty="0"/>
+              <a:t>this Lab, you should do the following:</a:t>
+            </a:r>
+          </a:p>
+          <a:p>
+            <a:pPr lvl="1"/>
+            <a:r>
+              <a:rPr lang="en-US" dirty="0" smtClean="0"/>
+              <a:t>We will create a resource that points to our </a:t>
+            </a:r>
+            <a:r>
+              <a:rPr lang="en-US" dirty="0" err="1" smtClean="0"/>
+              <a:t>ProductService</a:t>
+            </a:r>
+            <a:endParaRPr lang="en-US" dirty="0" smtClean="0"/>
+          </a:p>
+          <a:p>
+            <a:pPr lvl="2"/>
+            <a:r>
+              <a:rPr lang="en-US" dirty="0" smtClean="0"/>
+              <a:t>We will need to add a custom method for updating</a:t>
+            </a:r>
+          </a:p>
+          <a:p>
+            <a:pPr lvl="1"/>
+            <a:r>
+              <a:rPr lang="en-US" dirty="0" smtClean="0"/>
+              <a:t>We will wire the resource to supply a list of all available products</a:t>
+            </a:r>
+          </a:p>
+          <a:p>
+            <a:pPr lvl="1"/>
+            <a:r>
+              <a:rPr lang="en-US" dirty="0" smtClean="0"/>
+              <a:t>We will also wire the resource to save/update/delete/create new Products</a:t>
+            </a:r>
+          </a:p>
+          <a:p>
+            <a:endParaRPr lang="en-US" dirty="0" smtClean="0"/>
+          </a:p>
+          <a:p>
+            <a:endParaRPr lang="en-US" dirty="0"/>
           </a:p>
         </p:txBody>
       </p:sp>
@@ -19057,7 +19393,22 @@
             </a:r>
           </a:p>
           <a:p>
-            <a:endParaRPr lang="en-US" dirty="0"/>
+            <a:endParaRPr lang="en-US" dirty="0" smtClean="0"/>
+          </a:p>
+          <a:p>
+            <a:r>
+              <a:rPr lang="en-US" dirty="0">
+                <a:hlinkClick r:id="rId2"/>
+              </a:rPr>
+              <a:t>http://localhost:9080/Providers/Samples/Values</a:t>
+            </a:r>
+            <a:r>
+              <a:rPr lang="en-US" dirty="0" smtClean="0">
+                <a:hlinkClick r:id="rId2"/>
+              </a:rPr>
+              <a:t>/</a:t>
+            </a:r>
+            <a:endParaRPr lang="en-US" dirty="0" smtClean="0"/>
           </a:p>
         </p:txBody>
       </p:sp>
@@ -19374,6 +19725,27 @@
             <a:endParaRPr lang="en-US" dirty="0"/>
           </a:p>
           <a:p>
+            <a:endParaRPr lang="en-US" dirty="0" smtClean="0"/>
+          </a:p>
+          <a:p>
+            <a:endParaRPr lang="en-US" dirty="0" smtClean="0"/>
+          </a:p>
+          <a:p>
+            <a:r>
+              <a:rPr lang="en-US" dirty="0">
+                <a:hlinkClick r:id="rId2"/>
+              </a:rPr>
+              <a:t>http://localhost:9080/Providers/Samples/Factories</a:t>
+            </a:r>
+            <a:r>
+              <a:rPr lang="en-US" dirty="0" smtClean="0">
+                <a:hlinkClick r:id="rId2"/>
+              </a:rPr>
+              <a:t>/</a:t>
+            </a:r>
+            <a:endParaRPr lang="en-US" dirty="0" smtClean="0"/>
+          </a:p>
+          <a:p>
             <a:endParaRPr lang="en-US" dirty="0"/>
           </a:p>
         </p:txBody>
@@ -19476,7 +19848,72 @@
           <a:bodyPr/>
           <a:lstStyle/>
           <a:p>
-            <a:endParaRPr lang="en-US"/>
+            <a:r>
+              <a:rPr lang="en-US" dirty="0">
+                <a:hlinkClick r:id="rId2"/>
+              </a:rPr>
+              <a:t>http://</a:t>
+            </a:r>
+            <a:r>
+              <a:rPr lang="en-US" dirty="0" smtClean="0">
+                <a:hlinkClick r:id="rId2"/>
+              </a:rPr>
+              <a:t>localhost:9080/Providers/Exercises/Factories/</a:t>
+            </a:r>
+            <a:endParaRPr lang="en-US" dirty="0" smtClean="0"/>
+          </a:p>
+          <a:p>
+            <a:r>
+              <a:rPr lang="en-US" dirty="0" smtClean="0"/>
+              <a:t>Source</a:t>
+            </a:r>
+            <a:r>
+              <a:rPr lang="en-US" dirty="0"/>
+              <a:t>: /</a:t>
+            </a:r>
+            <a:r>
+              <a:rPr lang="en-US" dirty="0" err="1" smtClean="0"/>
+              <a:t>AngularClass</a:t>
+            </a:r>
+            <a:r>
+              <a:rPr lang="en-US" dirty="0" smtClean="0"/>
+              <a:t>/Providers/Exercises/Factories</a:t>
+            </a:r>
+            <a:endParaRPr lang="en-US" dirty="0"/>
+          </a:p>
+          <a:p>
+            <a:endParaRPr lang="en-US" dirty="0"/>
+          </a:p>
+          <a:p>
+            <a:r>
+              <a:rPr lang="en-US" dirty="0"/>
+              <a:t>In this Lab, you should do the following:</a:t>
+            </a:r>
+          </a:p>
+          <a:p>
+            <a:pPr lvl="1"/>
+            <a:r>
+              <a:rPr lang="en-US" dirty="0" smtClean="0"/>
+              <a:t>We want to build a factory to wrap our resource call</a:t>
+            </a:r>
+          </a:p>
+          <a:p>
+            <a:pPr lvl="2"/>
+            <a:r>
+              <a:rPr lang="en-US" dirty="0" smtClean="0"/>
+              <a:t>Make sure your factory also takes care of the update method</a:t>
+            </a:r>
+          </a:p>
+          <a:p>
+            <a:pPr lvl="1"/>
+            <a:r>
+              <a:rPr lang="en-US" dirty="0" smtClean="0"/>
+              <a:t>Change all of your $resource references in your controller to use the factory you built</a:t>
+            </a:r>
+            <a:endParaRPr lang="en-US" dirty="0"/>
+          </a:p>
+          <a:p>
+            <a:endParaRPr lang="en-US" dirty="0"/>
           </a:p>
         </p:txBody>
       </p:sp>
@@ -19756,7 +20193,67 @@
           <a:bodyPr/>
           <a:lstStyle/>
           <a:p>
-            <a:endParaRPr lang="en-US"/>
+            <a:r>
+              <a:rPr lang="en-US" dirty="0">
+                <a:hlinkClick r:id="rId2"/>
+              </a:rPr>
+              <a:t>http://</a:t>
+            </a:r>
+            <a:r>
+              <a:rPr lang="en-US" dirty="0" smtClean="0">
+                <a:hlinkClick r:id="rId2"/>
+              </a:rPr>
+              <a:t>localhost:9080/Providers/Exercises/Services</a:t>
+            </a:r>
+            <a:endParaRPr lang="en-US" dirty="0" smtClean="0"/>
+          </a:p>
+          <a:p>
+            <a:r>
+              <a:rPr lang="en-US" dirty="0" smtClean="0"/>
+              <a:t>Source: /</a:t>
+            </a:r>
+            <a:r>
+              <a:rPr lang="en-US" dirty="0" err="1" smtClean="0"/>
+              <a:t>AngularClass</a:t>
+            </a:r>
+            <a:r>
+              <a:rPr lang="en-US" dirty="0" smtClean="0"/>
+              <a:t>/Providers/Exercises/Services</a:t>
+            </a:r>
+          </a:p>
+          <a:p>
+            <a:endParaRPr lang="en-US" dirty="0"/>
+          </a:p>
+          <a:p>
+            <a:r>
+              <a:rPr lang="en-US" dirty="0"/>
+              <a:t>In this Lab, you should do the following:</a:t>
+            </a:r>
+          </a:p>
+          <a:p>
+            <a:pPr lvl="1"/>
+            <a:r>
+              <a:rPr lang="en-US" dirty="0" smtClean="0"/>
+              <a:t>You want to implement a service that wraps the factory </a:t>
+            </a:r>
+          </a:p>
+          <a:p>
+            <a:pPr lvl="1"/>
+            <a:r>
+              <a:rPr lang="en-US" dirty="0" smtClean="0"/>
+              <a:t>Refactor your factory calls in favor of </a:t>
+            </a:r>
+            <a:r>
+              <a:rPr lang="en-US" smtClean="0"/>
+              <a:t>your service calls</a:t>
+            </a:r>
+            <a:endParaRPr lang="en-US" dirty="0"/>
+          </a:p>
+          <a:p>
+            <a:endParaRPr lang="en-US" dirty="0" smtClean="0"/>
+          </a:p>
+          <a:p>
+            <a:endParaRPr lang="en-US" dirty="0"/>
           </a:p>
         </p:txBody>
       </p:sp>

</xml_diff>

<commit_message>
Added Exercises and Solutions for Directives
</commit_message>
<xml_diff>
--- a/materials/AngularJS.pptx
+++ b/materials/AngularJS.pptx
@@ -27882,14 +27882,10 @@
             </a:r>
             <a:r>
               <a:rPr lang="en-US" dirty="0" smtClean="0"/>
-              <a:t>” both of which will be referenced as literals because they are </a:t>
-            </a:r>
-            <a:r>
-              <a:rPr lang="en-US" smtClean="0"/>
-              <a:t>prefixed with a </a:t>
-            </a:r>
-            <a:r>
-              <a:rPr lang="en-US"/>
+              <a:t>” both of which will be referenced as literals because they are prefixed with a </a:t>
+            </a:r>
+            <a:r>
+              <a:rPr lang="en-US" dirty="0"/>
               <a:t>”@”</a:t>
             </a:r>
             <a:endParaRPr lang="en-US" b="1" dirty="0" smtClean="0">
@@ -28031,7 +28027,9 @@
         </p:nvSpPr>
         <p:spPr/>
         <p:txBody>
-          <a:bodyPr/>
+          <a:bodyPr>
+            <a:normAutofit fontScale="92500" lnSpcReduction="10000"/>
+          </a:bodyPr>
           <a:lstStyle/>
           <a:p>
             <a:r>
@@ -28142,8 +28140,30 @@
             </a:r>
             <a:r>
               <a:rPr lang="en-US" dirty="0"/>
-              <a:t> allows us to free up resources associated with either</a:t>
-            </a:r>
+              <a:t> allows us to free up resources associated with </a:t>
+            </a:r>
+            <a:r>
+              <a:rPr lang="en-US" dirty="0" smtClean="0"/>
+              <a:t>either</a:t>
+            </a:r>
+          </a:p>
+          <a:p>
+            <a:r>
+              <a:rPr lang="en-US" dirty="0">
+                <a:hlinkClick r:id="rId2"/>
+              </a:rPr>
+              <a:t>http://localhost:9080/Directives/Samples/Variables</a:t>
+            </a:r>
+            <a:r>
+              <a:rPr lang="en-US" dirty="0" smtClean="0">
+                <a:hlinkClick r:id="rId2"/>
+              </a:rPr>
+              <a:t>/</a:t>
+            </a:r>
+            <a:endParaRPr lang="en-US" dirty="0" smtClean="0"/>
+          </a:p>
+          <a:p>
+            <a:endParaRPr lang="en-US" dirty="0"/>
           </a:p>
           <a:p>
             <a:endParaRPr lang="en-US" dirty="0"/>
@@ -28248,7 +28268,68 @@
           <a:bodyPr/>
           <a:lstStyle/>
           <a:p>
-            <a:endParaRPr lang="en-US"/>
+            <a:r>
+              <a:rPr lang="en-US" dirty="0">
+                <a:hlinkClick r:id="rId2"/>
+              </a:rPr>
+              <a:t>http://localhost:9080/Directives/Exercises/Variables</a:t>
+            </a:r>
+            <a:r>
+              <a:rPr lang="en-US" dirty="0" smtClean="0">
+                <a:hlinkClick r:id="rId2"/>
+              </a:rPr>
+              <a:t>/</a:t>
+            </a:r>
+            <a:endParaRPr lang="en-US" dirty="0" smtClean="0"/>
+          </a:p>
+          <a:p>
+            <a:r>
+              <a:rPr lang="en-US" dirty="0"/>
+              <a:t>Source: /</a:t>
+            </a:r>
+            <a:r>
+              <a:rPr lang="en-US" dirty="0" err="1" smtClean="0"/>
+              <a:t>AngularClass</a:t>
+            </a:r>
+            <a:r>
+              <a:rPr lang="en-US" dirty="0" smtClean="0"/>
+              <a:t>/Directives/Exercises/Variables</a:t>
+            </a:r>
+            <a:endParaRPr lang="en-US" dirty="0"/>
+          </a:p>
+          <a:p>
+            <a:endParaRPr lang="en-US" dirty="0"/>
+          </a:p>
+          <a:p>
+            <a:r>
+              <a:rPr lang="en-US" dirty="0"/>
+              <a:t>In this Lab, you should do the following:</a:t>
+            </a:r>
+          </a:p>
+          <a:p>
+            <a:pPr lvl="1"/>
+            <a:r>
+              <a:rPr lang="en-US" dirty="0" smtClean="0"/>
+              <a:t>Create a timer directive that can be started, stopped, and reset</a:t>
+            </a:r>
+          </a:p>
+          <a:p>
+            <a:pPr lvl="2"/>
+            <a:r>
+              <a:rPr lang="en-US" dirty="0" smtClean="0"/>
+              <a:t>This lab relies on the use of $interval; it works similar to JavaScript's interval object</a:t>
+            </a:r>
+          </a:p>
+          <a:p>
+            <a:pPr lvl="1"/>
+            <a:r>
+              <a:rPr lang="en-US" dirty="0" smtClean="0"/>
+              <a:t>Will need to add it to the view so that it can look to increment the ticks variable on the controller</a:t>
+            </a:r>
+            <a:endParaRPr lang="en-US" dirty="0"/>
+          </a:p>
+          <a:p>
+            <a:endParaRPr lang="en-US" dirty="0"/>
           </a:p>
         </p:txBody>
       </p:sp>
@@ -28597,8 +28678,39 @@
             </a:r>
             <a:r>
               <a:rPr lang="en-US" dirty="0"/>
-              <a:t> code can resolve against the isolate scope of your custom directive</a:t>
-            </a:r>
+              <a:t> code can resolve against the isolate scope of your custom </a:t>
+            </a:r>
+            <a:r>
+              <a:rPr lang="en-US" dirty="0" smtClean="0"/>
+              <a:t>directive</a:t>
+            </a:r>
+          </a:p>
+          <a:p>
+            <a:endParaRPr lang="en-US" dirty="0"/>
+          </a:p>
+          <a:p>
+            <a:endParaRPr lang="en-US" dirty="0" smtClean="0"/>
+          </a:p>
+          <a:p>
+            <a:r>
+              <a:rPr lang="en-US" dirty="0">
+                <a:hlinkClick r:id="rId2"/>
+              </a:rPr>
+              <a:t>http://</a:t>
+            </a:r>
+            <a:r>
+              <a:rPr lang="en-US">
+                <a:hlinkClick r:id="rId2"/>
+              </a:rPr>
+              <a:t>localhost:9080/Directives/Samples/Transclusion</a:t>
+            </a:r>
+            <a:r>
+              <a:rPr lang="en-US" smtClean="0">
+                <a:hlinkClick r:id="rId2"/>
+              </a:rPr>
+              <a:t>/</a:t>
+            </a:r>
+            <a:endParaRPr lang="en-US" dirty="0"/>
           </a:p>
           <a:p>
             <a:endParaRPr lang="en-US" dirty="0"/>

</xml_diff>

<commit_message>
Added support for LAbs and end to end testing
</commit_message>
<xml_diff>
--- a/materials/AngularJS.pptx
+++ b/materials/AngularJS.pptx
@@ -5,10 +5,10 @@
     <p:sldMasterId id="2147483916" r:id="rId1"/>
   </p:sldMasterIdLst>
   <p:notesMasterIdLst>
-    <p:notesMasterId r:id="rId242"/>
+    <p:notesMasterId r:id="rId243"/>
   </p:notesMasterIdLst>
   <p:handoutMasterIdLst>
-    <p:handoutMasterId r:id="rId243"/>
+    <p:handoutMasterId r:id="rId244"/>
   </p:handoutMasterIdLst>
   <p:sldIdLst>
     <p:sldId id="256" r:id="rId2"/>
@@ -251,6 +251,7 @@
     <p:sldId id="476" r:id="rId239"/>
     <p:sldId id="477" r:id="rId240"/>
     <p:sldId id="478" r:id="rId241"/>
+    <p:sldId id="511" r:id="rId242"/>
   </p:sldIdLst>
   <p:sldSz cx="12192000" cy="6858000"/>
   <p:notesSz cx="6858000" cy="9144000"/>
@@ -30721,11 +30722,7 @@
             <a:pPr lvl="1"/>
             <a:r>
               <a:rPr lang="en-US" dirty="0" smtClean="0"/>
-              <a:t>Modify your view so that you are using </a:t>
-            </a:r>
-            <a:r>
-              <a:rPr lang="en-US" smtClean="0"/>
-              <a:t>the newly created pane directive</a:t>
+              <a:t>Modify your view so that you are using the newly created pane directive</a:t>
             </a:r>
             <a:endParaRPr lang="en-US" dirty="0"/>
           </a:p>
@@ -32234,14 +32231,39 @@
           <a:p>
             <a:r>
               <a:rPr lang="en-US" dirty="0"/>
-              <a:t>Override the appropriate named validator ('email' in this case)</a:t>
-            </a:r>
-          </a:p>
-          <a:p>
-            <a:r>
-              <a:rPr lang="en-US" dirty="0"/>
-              <a:t>Provide a function which returns true or false based on validity</a:t>
-            </a:r>
+              <a:t>Override the appropriate named validator </a:t>
+            </a:r>
+            <a:r>
+              <a:rPr lang="en-US" dirty="0" smtClean="0"/>
+              <a:t>(number' </a:t>
+            </a:r>
+            <a:r>
+              <a:rPr lang="en-US" dirty="0"/>
+              <a:t>in this case)</a:t>
+            </a:r>
+          </a:p>
+          <a:p>
+            <a:r>
+              <a:rPr lang="en-US" dirty="0"/>
+              <a:t>Provide a function which returns true or false based on </a:t>
+            </a:r>
+            <a:r>
+              <a:rPr lang="en-US" dirty="0" smtClean="0"/>
+              <a:t>validity</a:t>
+            </a:r>
+          </a:p>
+          <a:p>
+            <a:endParaRPr lang="en-US" dirty="0"/>
+          </a:p>
+          <a:p>
+            <a:endParaRPr lang="en-US" dirty="0" smtClean="0"/>
+          </a:p>
+          <a:p>
+            <a:r>
+              <a:rPr lang="en-US" dirty="0"/>
+              <a:t>http://localhost:9080/Directives/Samples/Validators/#/</a:t>
+            </a:r>
+            <a:endParaRPr lang="en-US" dirty="0"/>
           </a:p>
           <a:p>
             <a:endParaRPr lang="en-US" dirty="0"/>
@@ -32346,7 +32368,93 @@
           <a:bodyPr/>
           <a:lstStyle/>
           <a:p>
-            <a:endParaRPr lang="en-US"/>
+            <a:r>
+              <a:rPr lang="en-US" dirty="0">
+                <a:hlinkClick r:id="rId2"/>
+              </a:rPr>
+              <a:t>http://localhost:9080/Directives/Exercises/Validators</a:t>
+            </a:r>
+            <a:r>
+              <a:rPr lang="en-US" dirty="0" smtClean="0">
+                <a:hlinkClick r:id="rId2"/>
+              </a:rPr>
+              <a:t>/</a:t>
+            </a:r>
+            <a:endParaRPr lang="en-US" dirty="0" smtClean="0"/>
+          </a:p>
+          <a:p>
+            <a:r>
+              <a:rPr lang="en-US" dirty="0"/>
+              <a:t>Source: /</a:t>
+            </a:r>
+            <a:r>
+              <a:rPr lang="en-US" dirty="0" err="1" smtClean="0"/>
+              <a:t>AngularClass</a:t>
+            </a:r>
+            <a:r>
+              <a:rPr lang="en-US" dirty="0" smtClean="0"/>
+              <a:t>/Directives/Exercises/Validators</a:t>
+            </a:r>
+            <a:endParaRPr lang="en-US" dirty="0"/>
+          </a:p>
+          <a:p>
+            <a:endParaRPr lang="en-US" dirty="0"/>
+          </a:p>
+          <a:p>
+            <a:r>
+              <a:rPr lang="en-US" dirty="0"/>
+              <a:t>In this Lab, you should do the following:</a:t>
+            </a:r>
+          </a:p>
+          <a:p>
+            <a:pPr lvl="1"/>
+            <a:r>
+              <a:rPr lang="en-US" dirty="0" smtClean="0"/>
+              <a:t>You will create 3 directives used for validation</a:t>
+            </a:r>
+          </a:p>
+          <a:p>
+            <a:pPr lvl="2"/>
+            <a:r>
+              <a:rPr lang="en-US" dirty="0" smtClean="0"/>
+              <a:t>Override the number validator</a:t>
+            </a:r>
+          </a:p>
+          <a:p>
+            <a:pPr lvl="2"/>
+            <a:r>
+              <a:rPr lang="en-US" dirty="0" smtClean="0"/>
+              <a:t>Add a range validator</a:t>
+            </a:r>
+          </a:p>
+          <a:p>
+            <a:pPr lvl="2"/>
+            <a:r>
+              <a:rPr lang="en-US" dirty="0" smtClean="0"/>
+              <a:t>Check the product id </a:t>
+            </a:r>
+            <a:r>
+              <a:rPr lang="en-US" dirty="0" err="1" smtClean="0"/>
+              <a:t>asyncValidator</a:t>
+            </a:r>
+            <a:endParaRPr lang="en-US" dirty="0"/>
+          </a:p>
+          <a:p>
+            <a:pPr lvl="1"/>
+            <a:r>
+              <a:rPr lang="en-US" dirty="0" smtClean="0"/>
+              <a:t>You will modify the form to use these validators</a:t>
+            </a:r>
+          </a:p>
+          <a:p>
+            <a:pPr lvl="1"/>
+            <a:r>
+              <a:rPr lang="en-US" dirty="0" smtClean="0"/>
+              <a:t>Make sure you add a dependency to your directives module</a:t>
+            </a:r>
+          </a:p>
+          <a:p>
+            <a:endParaRPr lang="en-US" dirty="0"/>
           </a:p>
         </p:txBody>
       </p:sp>
@@ -34879,9 +34987,20 @@
           </a:p>
           <a:p>
             <a:r>
-              <a:rPr lang="en-US" dirty="0" smtClean="0"/>
-              <a:t>Example</a:t>
-            </a:r>
+              <a:rPr lang="en-US" dirty="0"/>
+              <a:t>/</a:t>
+            </a:r>
+            <a:r>
+              <a:rPr lang="en-US" dirty="0" err="1" smtClean="0"/>
+              <a:t>AngularClass</a:t>
+            </a:r>
+            <a:r>
+              <a:rPr lang="en-US" dirty="0" smtClean="0"/>
+              <a:t>/End2EndTesting/Samples/Basic</a:t>
+            </a:r>
+            <a:endParaRPr lang="en-US" dirty="0"/>
+          </a:p>
+          <a:p>
             <a:endParaRPr lang="en-US" dirty="0"/>
           </a:p>
         </p:txBody>
@@ -34984,6 +35103,38 @@
           <a:bodyPr/>
           <a:lstStyle/>
           <a:p>
+            <a:r>
+              <a:rPr lang="en-US" dirty="0"/>
+              <a:t>/</a:t>
+            </a:r>
+            <a:r>
+              <a:rPr lang="en-US" dirty="0" err="1" smtClean="0"/>
+              <a:t>AngularClass</a:t>
+            </a:r>
+            <a:r>
+              <a:rPr lang="en-US" dirty="0" smtClean="0"/>
+              <a:t>/End2EndTesting/Exercises/Basic</a:t>
+            </a:r>
+            <a:endParaRPr lang="en-US" dirty="0"/>
+          </a:p>
+          <a:p>
+            <a:endParaRPr lang="en-US" dirty="0"/>
+          </a:p>
+          <a:p>
+            <a:r>
+              <a:rPr lang="en-US" dirty="0"/>
+              <a:t>In this Lab, you should do the following:</a:t>
+            </a:r>
+          </a:p>
+          <a:p>
+            <a:pPr lvl="1"/>
+            <a:r>
+              <a:rPr lang="en-US" dirty="0" smtClean="0"/>
+              <a:t>Write a simple end to end test that verifies your Product Page has loaded and (At minimum) you have verified that all your product elements are on the page.</a:t>
+            </a:r>
+            <a:endParaRPr lang="en-US" dirty="0"/>
+          </a:p>
+          <a:p>
             <a:endParaRPr lang="en-US" dirty="0"/>
           </a:p>
         </p:txBody>
@@ -35465,7 +35616,9 @@
         </p:nvSpPr>
         <p:spPr/>
         <p:txBody>
-          <a:bodyPr/>
+          <a:bodyPr>
+            <a:normAutofit lnSpcReduction="10000"/>
+          </a:bodyPr>
           <a:lstStyle/>
           <a:p>
             <a:r>
@@ -35631,9 +35784,30 @@
               <a:t>fn</a:t>
             </a:r>
             <a:r>
-              <a:rPr lang="en-US" sz="2400" b="1" dirty="0"/>
+              <a:rPr lang="en-US" sz="2400" b="1" dirty="0" smtClean="0"/>
               <a:t>)</a:t>
             </a:r>
+            <a:endParaRPr lang="en-US" sz="2400" b="1" dirty="0"/>
+          </a:p>
+          <a:p>
+            <a:endParaRPr lang="en-US" dirty="0" smtClean="0"/>
+          </a:p>
+          <a:p>
+            <a:r>
+              <a:rPr lang="en-US" dirty="0" smtClean="0"/>
+              <a:t>/</a:t>
+            </a:r>
+            <a:r>
+              <a:rPr lang="en-US" dirty="0" err="1" smtClean="0"/>
+              <a:t>AngularClass</a:t>
+            </a:r>
+            <a:r>
+              <a:rPr lang="en-US" dirty="0" smtClean="0"/>
+              <a:t>/End2EndTesting/Samples/Mocked</a:t>
+            </a:r>
+            <a:endParaRPr lang="en-US" dirty="0"/>
+          </a:p>
+          <a:p>
             <a:endParaRPr lang="en-US" b="1" dirty="0"/>
           </a:p>
           <a:p>
@@ -35973,7 +36147,53 @@
           <a:bodyPr/>
           <a:lstStyle/>
           <a:p>
-            <a:endParaRPr lang="en-US"/>
+            <a:r>
+              <a:rPr lang="en-US" dirty="0"/>
+              <a:t>/</a:t>
+            </a:r>
+            <a:r>
+              <a:rPr lang="en-US" dirty="0" err="1" smtClean="0"/>
+              <a:t>AngularClass</a:t>
+            </a:r>
+            <a:r>
+              <a:rPr lang="en-US" dirty="0" smtClean="0"/>
+              <a:t>/End2EndTesting/Exercises/Mocked</a:t>
+            </a:r>
+            <a:endParaRPr lang="en-US" dirty="0"/>
+          </a:p>
+          <a:p>
+            <a:endParaRPr lang="en-US" dirty="0"/>
+          </a:p>
+          <a:p>
+            <a:r>
+              <a:rPr lang="en-US" dirty="0"/>
+              <a:t>In this Lab, you should do the following:</a:t>
+            </a:r>
+          </a:p>
+          <a:p>
+            <a:pPr lvl="1"/>
+            <a:r>
+              <a:rPr lang="en-US" dirty="0" smtClean="0"/>
+              <a:t>You should look to create a mock backend and respond to the Products endpoint with a static data set</a:t>
+            </a:r>
+          </a:p>
+          <a:p>
+            <a:pPr lvl="1"/>
+            <a:r>
+              <a:rPr lang="en-US" dirty="0" smtClean="0"/>
+              <a:t>Switch your HTML page over to use your mocking module</a:t>
+            </a:r>
+          </a:p>
+          <a:p>
+            <a:pPr lvl="1"/>
+            <a:r>
+              <a:rPr lang="en-US" dirty="0" smtClean="0"/>
+              <a:t>Write your tests</a:t>
+            </a:r>
+            <a:endParaRPr lang="en-US" dirty="0"/>
+          </a:p>
+          <a:p>
+            <a:endParaRPr lang="en-US" dirty="0"/>
           </a:p>
         </p:txBody>
       </p:sp>
@@ -36004,6 +36224,165 @@
     <p:extLst>
       <p:ext uri="{BB962C8B-B14F-4D97-AF65-F5344CB8AC3E}">
         <p14:creationId xmlns:p14="http://schemas.microsoft.com/office/powerpoint/2010/main" val="444608758"/>
+      </p:ext>
+    </p:extLst>
+  </p:cSld>
+  <p:clrMapOvr>
+    <a:masterClrMapping/>
+  </p:clrMapOvr>
+  <p:timing>
+    <p:tnLst>
+      <p:par>
+        <p:cTn id="1" dur="indefinite" restart="never" nodeType="tmRoot"/>
+      </p:par>
+    </p:tnLst>
+  </p:timing>
+</p:sld>
+</file>
+
+<file path=ppt/slides/slide241.xml><?xml version="1.0" encoding="utf-8"?>
+<p:sld xmlns:a="http://schemas.openxmlformats.org/drawingml/2006/main" xmlns:r="http://schemas.openxmlformats.org/officeDocument/2006/relationships" xmlns:p="http://schemas.openxmlformats.org/presentationml/2006/main">
+  <p:cSld>
+    <p:spTree>
+      <p:nvGrpSpPr>
+        <p:cNvPr id="1" name=""/>
+        <p:cNvGrpSpPr/>
+        <p:nvPr/>
+      </p:nvGrpSpPr>
+      <p:grpSpPr>
+        <a:xfrm>
+          <a:off x="0" y="0"/>
+          <a:ext cx="0" cy="0"/>
+          <a:chOff x="0" y="0"/>
+          <a:chExt cx="0" cy="0"/>
+        </a:xfrm>
+      </p:grpSpPr>
+      <p:sp>
+        <p:nvSpPr>
+          <p:cNvPr id="2" name="Title 1"/>
+          <p:cNvSpPr>
+            <a:spLocks noGrp="1"/>
+          </p:cNvSpPr>
+          <p:nvPr>
+            <p:ph type="title"/>
+          </p:nvPr>
+        </p:nvSpPr>
+        <p:spPr/>
+        <p:txBody>
+          <a:bodyPr/>
+          <a:lstStyle/>
+          <a:p>
+            <a:r>
+              <a:rPr lang="en-US" dirty="0" smtClean="0"/>
+              <a:t>Thanks and last Questions?</a:t>
+            </a:r>
+            <a:endParaRPr lang="en-US" dirty="0"/>
+          </a:p>
+        </p:txBody>
+      </p:sp>
+      <p:sp>
+        <p:nvSpPr>
+          <p:cNvPr id="3" name="Content Placeholder 2"/>
+          <p:cNvSpPr>
+            <a:spLocks noGrp="1"/>
+          </p:cNvSpPr>
+          <p:nvPr>
+            <p:ph idx="1"/>
+          </p:nvPr>
+        </p:nvSpPr>
+        <p:spPr/>
+        <p:txBody>
+          <a:bodyPr/>
+          <a:lstStyle/>
+          <a:p>
+            <a:endParaRPr lang="en-US" dirty="0" smtClean="0"/>
+          </a:p>
+          <a:p>
+            <a:r>
+              <a:rPr lang="en-US" dirty="0" smtClean="0"/>
+              <a:t>It’s been a great couple of days. Thanks very much for your time and I hope you found this course valuable.</a:t>
+            </a:r>
+            <a:endParaRPr lang="en-US" dirty="0"/>
+          </a:p>
+          <a:p>
+            <a:endParaRPr lang="en-US" dirty="0"/>
+          </a:p>
+          <a:p>
+            <a:r>
+              <a:rPr lang="en-US" dirty="0" smtClean="0"/>
+              <a:t>Contact Info</a:t>
+            </a:r>
+          </a:p>
+          <a:p>
+            <a:pPr lvl="1"/>
+            <a:r>
+              <a:rPr lang="en-US" dirty="0" smtClean="0"/>
+              <a:t>Stephen Bechtold</a:t>
+            </a:r>
+          </a:p>
+          <a:p>
+            <a:pPr lvl="1"/>
+            <a:r>
+              <a:rPr lang="en-US" dirty="0" smtClean="0"/>
+              <a:t>Email: </a:t>
+            </a:r>
+            <a:r>
+              <a:rPr lang="en-US" dirty="0" smtClean="0">
+                <a:hlinkClick r:id="rId2"/>
+              </a:rPr>
+              <a:t>sbechtold@buildinmotion.com</a:t>
+            </a:r>
+            <a:endParaRPr lang="en-US" dirty="0" smtClean="0"/>
+          </a:p>
+          <a:p>
+            <a:pPr lvl="1"/>
+            <a:r>
+              <a:rPr lang="en-US" dirty="0" smtClean="0"/>
+              <a:t>Phone: (412) 449-1939 x 101</a:t>
+            </a:r>
+          </a:p>
+          <a:p>
+            <a:pPr lvl="1"/>
+            <a:r>
+              <a:rPr lang="en-US" dirty="0" smtClean="0"/>
+              <a:t>Cell: (412) 223-7346</a:t>
+            </a:r>
+          </a:p>
+          <a:p>
+            <a:endParaRPr lang="en-US" dirty="0"/>
+          </a:p>
+          <a:p>
+            <a:endParaRPr lang="en-US" dirty="0"/>
+          </a:p>
+        </p:txBody>
+      </p:sp>
+      <p:sp>
+        <p:nvSpPr>
+          <p:cNvPr id="4" name="Slide Number Placeholder 3"/>
+          <p:cNvSpPr>
+            <a:spLocks noGrp="1"/>
+          </p:cNvSpPr>
+          <p:nvPr>
+            <p:ph type="sldNum" sz="quarter" idx="12"/>
+          </p:nvPr>
+        </p:nvSpPr>
+        <p:spPr/>
+        <p:txBody>
+          <a:bodyPr/>
+          <a:lstStyle/>
+          <a:p>
+            <a:fld id="{B4835A8B-4C3B-9C46-9281-F5EB1FED4738}" type="slidenum">
+              <a:rPr lang="en-US" smtClean="0"/>
+              <a:t>241</a:t>
+            </a:fld>
+            <a:endParaRPr lang="en-US"/>
+          </a:p>
+        </p:txBody>
+      </p:sp>
+    </p:spTree>
+    <p:extLst>
+      <p:ext uri="{BB962C8B-B14F-4D97-AF65-F5344CB8AC3E}">
+        <p14:creationId xmlns:p14="http://schemas.microsoft.com/office/powerpoint/2010/main" val="631412501"/>
       </p:ext>
     </p:extLst>
   </p:cSld>

</xml_diff>

<commit_message>
Altered the powerpoint becuase the routing section was rough and changed the test and controllers to remove bad references
</commit_message>
<xml_diff>
--- a/materials/AngularJS.pptx
+++ b/materials/AngularJS.pptx
@@ -49728,7 +49728,7 @@
               <a:t>&lt;div ng-repeat=“one in all | </a:t>
             </a:r>
             <a:r>
-              <a:rPr lang="en-US" b="1" smtClean="0"/>
+              <a:rPr lang="en-US" b="1" dirty="0" err="1" smtClean="0"/>
               <a:t>filter:myFilter</a:t>
             </a:r>
             <a:r>
@@ -52451,22 +52451,11 @@
           <a:p>
             <a:r>
               <a:rPr lang="en-US" dirty="0" smtClean="0"/>
-              <a:t>You’ll notice in the </a:t>
-            </a:r>
-            <a:r>
-              <a:rPr lang="en-US" dirty="0" err="1" smtClean="0"/>
-              <a:t>DetailController</a:t>
-            </a:r>
-            <a:r>
-              <a:rPr lang="en-US" dirty="0" smtClean="0"/>
-              <a:t> configuration the route was set to the following ”/:Id”</a:t>
-            </a:r>
-            <a:endParaRPr lang="en-US" b="1" dirty="0" smtClean="0"/>
-          </a:p>
-          <a:p>
-            <a:r>
-              <a:rPr lang="en-US" dirty="0" smtClean="0"/>
-              <a:t>The routing framework supports named parameters within your URL that start with a colon (</a:t>
+              <a:t>The </a:t>
+            </a:r>
+            <a:r>
+              <a:rPr lang="en-US" dirty="0" smtClean="0"/>
+              <a:t>routing framework supports named parameters within your URL that start with a colon (</a:t>
             </a:r>
             <a:r>
               <a:rPr lang="en-US" dirty="0" smtClean="0">
@@ -52727,27 +52716,29 @@
         <p:spPr/>
         <p:txBody>
           <a:bodyPr>
-            <a:normAutofit fontScale="92500" lnSpcReduction="20000"/>
+            <a:normAutofit lnSpcReduction="10000"/>
           </a:bodyPr>
           <a:lstStyle/>
           <a:p>
             <a:r>
               <a:rPr lang="en-US" dirty="0" smtClean="0"/>
-              <a:t>The last thing we’ll need to do is access our route parameters from our controllers. Going back to the example, you’ll notice that the Detail Controller took an </a:t>
-            </a:r>
-            <a:r>
-              <a:rPr lang="en-US" b="1" dirty="0" smtClean="0"/>
-              <a:t>Id</a:t>
-            </a:r>
-            <a:r>
-              <a:rPr lang="en-US" dirty="0" smtClean="0"/>
-              <a:t> parameter from the URL</a:t>
-            </a:r>
-          </a:p>
-          <a:p>
-            <a:r>
-              <a:rPr lang="en-US" dirty="0" smtClean="0"/>
-              <a:t>To reference this value all we need to do is add the </a:t>
+              <a:t>The last thing we’ll need to do is access our route parameters from our controllers. </a:t>
+            </a:r>
+            <a:r>
+              <a:rPr lang="en-US" dirty="0" smtClean="0"/>
+              <a:t>To </a:t>
+            </a:r>
+            <a:r>
+              <a:rPr lang="en-US" dirty="0" smtClean="0"/>
+              <a:t>reference </a:t>
+            </a:r>
+            <a:r>
+              <a:rPr lang="en-US" dirty="0" smtClean="0"/>
+              <a:t>our values </a:t>
+            </a:r>
+            <a:r>
+              <a:rPr lang="en-US" dirty="0" smtClean="0"/>
+              <a:t>all we need to do is add the </a:t>
             </a:r>
             <a:r>
               <a:rPr lang="en-US" b="1" dirty="0" smtClean="0"/>
@@ -52765,8 +52756,17 @@
           <a:p>
             <a:r>
               <a:rPr lang="en-US" dirty="0" smtClean="0"/>
-              <a:t>Suppose this controller:</a:t>
-            </a:r>
+              <a:t>Supposing we have a route parameter named </a:t>
+            </a:r>
+            <a:r>
+              <a:rPr lang="en-US" b="1" dirty="0" smtClean="0"/>
+              <a:t>:id </a:t>
+            </a:r>
+            <a:r>
+              <a:rPr lang="en-US" dirty="0" smtClean="0"/>
+              <a:t>and our controller is defined as:</a:t>
+            </a:r>
+            <a:endParaRPr lang="en-US" dirty="0" smtClean="0"/>
           </a:p>
           <a:p>
             <a:pPr marL="292608" lvl="1" indent="0">
@@ -52807,8 +52807,21 @@
           <a:p>
             <a:r>
               <a:rPr lang="en-US" dirty="0" smtClean="0"/>
-              <a:t>We need to change it to this:</a:t>
-            </a:r>
+              <a:t>In order to access the </a:t>
+            </a:r>
+            <a:r>
+              <a:rPr lang="en-US" b="1" dirty="0" smtClean="0"/>
+              <a:t>id </a:t>
+            </a:r>
+            <a:r>
+              <a:rPr lang="en-US" dirty="0" smtClean="0"/>
+              <a:t>property we  would need to change it to </a:t>
+            </a:r>
+            <a:r>
+              <a:rPr lang="en-US" smtClean="0"/>
+              <a:t>the following:</a:t>
+            </a:r>
+            <a:endParaRPr lang="en-US" dirty="0" smtClean="0"/>
           </a:p>
           <a:p>
             <a:pPr marL="292608" lvl="1" indent="0">

</xml_diff>

<commit_message>
Added some additonal test cases for updating data
</commit_message>
<xml_diff>
--- a/materials/AngularJS.pptx
+++ b/materials/AngularJS.pptx
@@ -458,7 +458,7 @@
           <a:p>
             <a:fld id="{3EED33BA-F7FE-3846-90E5-586BB4D95682}" type="datetimeFigureOut">
               <a:rPr lang="en-US" smtClean="0"/>
-              <a:t>3/8/16</a:t>
+              <a:t>3/9/16</a:t>
             </a:fld>
             <a:endParaRPr lang="en-US"/>
           </a:p>
@@ -623,7 +623,7 @@
           <a:p>
             <a:fld id="{79A26C4C-ED93-5E40-B7EC-1A7ABE57B733}" type="datetimeFigureOut">
               <a:rPr lang="en-US" smtClean="0"/>
-              <a:t>3/8/16</a:t>
+              <a:t>3/9/16</a:t>
             </a:fld>
             <a:endParaRPr lang="en-US"/>
           </a:p>
@@ -1653,6 +1653,98 @@
 </p:notes>
 </file>
 
+<file path=ppt/notesSlides/notesSlide9.xml><?xml version="1.0" encoding="utf-8"?>
+<p:notes xmlns:a="http://schemas.openxmlformats.org/drawingml/2006/main" xmlns:r="http://schemas.openxmlformats.org/officeDocument/2006/relationships" xmlns:p="http://schemas.openxmlformats.org/presentationml/2006/main">
+  <p:cSld>
+    <p:spTree>
+      <p:nvGrpSpPr>
+        <p:cNvPr id="1" name=""/>
+        <p:cNvGrpSpPr/>
+        <p:nvPr/>
+      </p:nvGrpSpPr>
+      <p:grpSpPr>
+        <a:xfrm>
+          <a:off x="0" y="0"/>
+          <a:ext cx="0" cy="0"/>
+          <a:chOff x="0" y="0"/>
+          <a:chExt cx="0" cy="0"/>
+        </a:xfrm>
+      </p:grpSpPr>
+      <p:sp>
+        <p:nvSpPr>
+          <p:cNvPr id="2" name="Slide Image Placeholder 1"/>
+          <p:cNvSpPr>
+            <a:spLocks noGrp="1" noRot="1" noChangeAspect="1"/>
+          </p:cNvSpPr>
+          <p:nvPr>
+            <p:ph type="sldImg"/>
+          </p:nvPr>
+        </p:nvSpPr>
+        <p:spPr/>
+      </p:sp>
+      <p:sp>
+        <p:nvSpPr>
+          <p:cNvPr id="3" name="Notes Placeholder 2"/>
+          <p:cNvSpPr>
+            <a:spLocks noGrp="1"/>
+          </p:cNvSpPr>
+          <p:nvPr>
+            <p:ph type="body" idx="1"/>
+          </p:nvPr>
+        </p:nvSpPr>
+        <p:spPr/>
+        <p:txBody>
+          <a:bodyPr/>
+          <a:lstStyle/>
+          <a:p>
+            <a:r>
+              <a:rPr lang="en-US" dirty="0" smtClean="0"/>
+              <a:t>End of Day</a:t>
+            </a:r>
+            <a:r>
+              <a:rPr lang="en-US" baseline="0" dirty="0" smtClean="0"/>
+              <a:t> 3</a:t>
+            </a:r>
+            <a:endParaRPr lang="en-US" dirty="0"/>
+          </a:p>
+        </p:txBody>
+      </p:sp>
+      <p:sp>
+        <p:nvSpPr>
+          <p:cNvPr id="4" name="Slide Number Placeholder 3"/>
+          <p:cNvSpPr>
+            <a:spLocks noGrp="1"/>
+          </p:cNvSpPr>
+          <p:nvPr>
+            <p:ph type="sldNum" sz="quarter" idx="10"/>
+          </p:nvPr>
+        </p:nvSpPr>
+        <p:spPr/>
+        <p:txBody>
+          <a:bodyPr/>
+          <a:lstStyle/>
+          <a:p>
+            <a:fld id="{96E0C481-39FA-644C-9AAA-5FF319C01BC2}" type="slidenum">
+              <a:rPr lang="en-US" smtClean="0"/>
+              <a:t>193</a:t>
+            </a:fld>
+            <a:endParaRPr lang="en-US"/>
+          </a:p>
+        </p:txBody>
+      </p:sp>
+    </p:spTree>
+    <p:extLst>
+      <p:ext uri="{BB962C8B-B14F-4D97-AF65-F5344CB8AC3E}">
+        <p14:creationId xmlns:p14="http://schemas.microsoft.com/office/powerpoint/2010/main" val="90613362"/>
+      </p:ext>
+    </p:extLst>
+  </p:cSld>
+  <p:clrMapOvr>
+    <a:masterClrMapping/>
+  </p:clrMapOvr>
+</p:notes>
+</file>
+
 <file path=ppt/slideLayouts/slideLayout1.xml><?xml version="1.0" encoding="utf-8"?>
 <p:sldLayout xmlns:a="http://schemas.openxmlformats.org/drawingml/2006/main" xmlns:r="http://schemas.openxmlformats.org/officeDocument/2006/relationships" xmlns:p="http://schemas.openxmlformats.org/presentationml/2006/main" showMasterSp="0" type="title" preserve="1">
   <p:cSld name="Title Slide">
@@ -1879,7 +1971,7 @@
           <a:p>
             <a:fld id="{8E98D209-F362-B44D-97CF-AFBA74F88441}" type="datetime1">
               <a:rPr lang="en-US" smtClean="0"/>
-              <a:t>3/8/16</a:t>
+              <a:t>3/9/16</a:t>
             </a:fld>
             <a:endParaRPr lang="en-US"/>
           </a:p>
@@ -2092,7 +2184,7 @@
           <a:p>
             <a:fld id="{11286818-5C76-9546-B410-9A9D828819A5}" type="datetime1">
               <a:rPr lang="en-US" smtClean="0"/>
-              <a:t>3/8/16</a:t>
+              <a:t>3/9/16</a:t>
             </a:fld>
             <a:endParaRPr lang="en-US"/>
           </a:p>
@@ -2348,7 +2440,7 @@
           <a:p>
             <a:fld id="{C055C5EF-2E56-A44B-8597-3375D9DFAB8A}" type="datetime1">
               <a:rPr lang="en-US" smtClean="0"/>
-              <a:t>3/8/16</a:t>
+              <a:t>3/9/16</a:t>
             </a:fld>
             <a:endParaRPr lang="en-US"/>
           </a:p>
@@ -2527,7 +2619,7 @@
           <a:p>
             <a:fld id="{12B6ED30-0850-1347-BD90-917B5585DEBB}" type="datetime1">
               <a:rPr lang="en-US" smtClean="0"/>
-              <a:t>3/8/16</a:t>
+              <a:t>3/9/16</a:t>
             </a:fld>
             <a:endParaRPr lang="en-US"/>
           </a:p>
@@ -2870,7 +2962,7 @@
           <a:p>
             <a:fld id="{AEFA16D7-52E9-D246-963E-B14067688DE6}" type="datetime1">
               <a:rPr lang="en-US" smtClean="0"/>
-              <a:t>3/8/16</a:t>
+              <a:t>3/9/16</a:t>
             </a:fld>
             <a:endParaRPr lang="en-US"/>
           </a:p>
@@ -3150,7 +3242,7 @@
           <a:p>
             <a:fld id="{9F1BDAAA-F027-1549-9BE8-E1ACF710FF5D}" type="datetime1">
               <a:rPr lang="en-US" smtClean="0"/>
-              <a:t>3/8/16</a:t>
+              <a:t>3/9/16</a:t>
             </a:fld>
             <a:endParaRPr lang="en-US"/>
           </a:p>
@@ -3529,7 +3621,7 @@
           <a:p>
             <a:fld id="{BDE0685A-E973-374C-849D-02B7207C1E7D}" type="datetime1">
               <a:rPr lang="en-US" smtClean="0"/>
-              <a:t>3/8/16</a:t>
+              <a:t>3/9/16</a:t>
             </a:fld>
             <a:endParaRPr lang="en-US"/>
           </a:p>
@@ -3647,7 +3739,7 @@
           <a:p>
             <a:fld id="{7A608878-9225-9B4B-8E3E-165829353C70}" type="datetime1">
               <a:rPr lang="en-US" smtClean="0"/>
-              <a:t>3/8/16</a:t>
+              <a:t>3/9/16</a:t>
             </a:fld>
             <a:endParaRPr lang="en-US"/>
           </a:p>
@@ -3818,7 +3910,7 @@
           <a:p>
             <a:fld id="{2542FA2B-8C7B-804D-A79B-894EE20EDCE4}" type="datetime1">
               <a:rPr lang="en-US" smtClean="0"/>
-              <a:t>3/8/16</a:t>
+              <a:t>3/9/16</a:t>
             </a:fld>
             <a:endParaRPr lang="en-US"/>
           </a:p>
@@ -4177,7 +4269,7 @@
           <a:p>
             <a:fld id="{93CC10F7-50DE-9448-AB3A-4E7876BC288D}" type="datetime1">
               <a:rPr lang="en-US" smtClean="0"/>
-              <a:t>3/8/16</a:t>
+              <a:t>3/9/16</a:t>
             </a:fld>
             <a:endParaRPr lang="en-US"/>
           </a:p>
@@ -4564,7 +4656,7 @@
           <a:p>
             <a:fld id="{AF65105B-CC8E-3D4E-9293-479129E31B0C}" type="datetime1">
               <a:rPr lang="en-US" smtClean="0"/>
-              <a:t>3/8/16</a:t>
+              <a:t>3/9/16</a:t>
             </a:fld>
             <a:endParaRPr lang="en-US"/>
           </a:p>
@@ -4851,7 +4943,7 @@
           <a:p>
             <a:fld id="{FBCC4294-156C-024A-BF41-3CA81B92D962}" type="datetime1">
               <a:rPr lang="en-US" smtClean="0"/>
-              <a:t>3/8/16</a:t>
+              <a:t>3/9/16</a:t>
             </a:fld>
             <a:endParaRPr lang="en-US"/>
           </a:p>
@@ -23676,8 +23768,8 @@
           <a:p>
             <a:pPr lvl="1"/>
             <a:r>
-              <a:rPr lang="en-US" b="1" dirty="0" err="1" smtClean="0"/>
-              <a:t>debouce</a:t>
+              <a:rPr lang="en-US" b="1" smtClean="0"/>
+              <a:t>debounce</a:t>
             </a:r>
             <a:r>
               <a:rPr lang="en-US" b="1" dirty="0" smtClean="0"/>
@@ -26302,13 +26394,13 @@
           <a:p>
             <a:r>
               <a:rPr lang="en-US" dirty="0">
-                <a:hlinkClick r:id="rId2"/>
+                <a:hlinkClick r:id="rId3"/>
               </a:rPr>
               <a:t>http://</a:t>
             </a:r>
             <a:r>
               <a:rPr lang="en-US" dirty="0" smtClean="0">
-                <a:hlinkClick r:id="rId2"/>
+                <a:hlinkClick r:id="rId3"/>
               </a:rPr>
               <a:t>localhost:9080/Forms/Exercises/NgMessages/</a:t>
             </a:r>
@@ -52543,11 +52635,7 @@
           <a:p>
             <a:r>
               <a:rPr lang="en-US" dirty="0" smtClean="0"/>
-              <a:t>The </a:t>
-            </a:r>
-            <a:r>
-              <a:rPr lang="en-US" dirty="0" smtClean="0"/>
-              <a:t>routing framework supports named parameters within your URL that start with a colon (</a:t>
+              <a:t>The routing framework supports named parameters within your URL that start with a colon (</a:t>
             </a:r>
             <a:r>
               <a:rPr lang="en-US" dirty="0" smtClean="0">
@@ -52814,23 +52902,7 @@
           <a:p>
             <a:r>
               <a:rPr lang="en-US" dirty="0" smtClean="0"/>
-              <a:t>The last thing we’ll need to do is access our route parameters from our controllers. </a:t>
-            </a:r>
-            <a:r>
-              <a:rPr lang="en-US" dirty="0" smtClean="0"/>
-              <a:t>To </a:t>
-            </a:r>
-            <a:r>
-              <a:rPr lang="en-US" dirty="0" smtClean="0"/>
-              <a:t>reference </a:t>
-            </a:r>
-            <a:r>
-              <a:rPr lang="en-US" dirty="0" smtClean="0"/>
-              <a:t>our values </a:t>
-            </a:r>
-            <a:r>
-              <a:rPr lang="en-US" dirty="0" smtClean="0"/>
-              <a:t>all we need to do is add the </a:t>
+              <a:t>The last thing we’ll need to do is access our route parameters from our controllers. To reference our values all we need to do is add the </a:t>
             </a:r>
             <a:r>
               <a:rPr lang="en-US" b="1" dirty="0" smtClean="0"/>
@@ -52858,7 +52930,6 @@
               <a:rPr lang="en-US" dirty="0" smtClean="0"/>
               <a:t>and our controller is defined as:</a:t>
             </a:r>
-            <a:endParaRPr lang="en-US" dirty="0" smtClean="0"/>
           </a:p>
           <a:p>
             <a:pPr marL="292608" lvl="1" indent="0">
@@ -52909,7 +52980,6 @@
               <a:rPr lang="en-US" dirty="0" smtClean="0"/>
               <a:t>property we  would need to change it to the following:</a:t>
             </a:r>
-            <a:endParaRPr lang="en-US" dirty="0" smtClean="0"/>
           </a:p>
           <a:p>
             <a:pPr marL="292608" lvl="1" indent="0">

</xml_diff>

<commit_message>
Added a directive to show the from state
</commit_message>
<xml_diff>
--- a/materials/AngularJS.pptx
+++ b/materials/AngularJS.pptx
@@ -23768,7 +23768,7 @@
           <a:p>
             <a:pPr lvl="1"/>
             <a:r>
-              <a:rPr lang="en-US" b="1" smtClean="0"/>
+              <a:rPr lang="en-US" b="1" dirty="0" err="1" smtClean="0"/>
               <a:t>debounce</a:t>
             </a:r>
             <a:r>
@@ -28062,7 +28062,22 @@
             <a:pPr lvl="1"/>
             <a:r>
               <a:rPr lang="en-US" dirty="0" smtClean="0"/>
-              <a:t>Variables prefixed with a “=“ are evaluated prior to being set to the associated scope variable</a:t>
+              <a:t>Variables prefixed with a “=“ are evaluated prior to being set to the associated scope </a:t>
+            </a:r>
+            <a:r>
+              <a:rPr lang="en-US" dirty="0" smtClean="0"/>
+              <a:t>variable</a:t>
+            </a:r>
+          </a:p>
+          <a:p>
+            <a:pPr lvl="1"/>
+            <a:r>
+              <a:rPr lang="en-US" dirty="0" smtClean="0"/>
+              <a:t>Variables prefixed with a </a:t>
+            </a:r>
+            <a:r>
+              <a:rPr lang="en-US" smtClean="0"/>
+              <a:t>“&amp;” are </a:t>
             </a:r>
             <a:endParaRPr lang="en-US" dirty="0"/>
           </a:p>
@@ -28122,35 +28137,9 @@
               <a:t>” both of which will be referenced as literals because they are prefixed with a </a:t>
             </a:r>
             <a:r>
-              <a:rPr lang="en-US" dirty="0"/>
+              <a:rPr lang="en-US" dirty="0" smtClean="0"/>
               <a:t>”@”</a:t>
             </a:r>
-            <a:endParaRPr lang="en-US" b="1" dirty="0" smtClean="0">
-              <a:hlinkClick r:id="rId2"/>
-            </a:endParaRPr>
-          </a:p>
-          <a:p>
-            <a:r>
-              <a:rPr lang="en-US" dirty="0" smtClean="0">
-                <a:hlinkClick r:id="rId2"/>
-              </a:rPr>
-              <a:t>http://</a:t>
-            </a:r>
-            <a:r>
-              <a:rPr lang="en-US" dirty="0">
-                <a:hlinkClick r:id="rId2"/>
-              </a:rPr>
-              <a:t>localhost:9080/Directives/Samples/Variables</a:t>
-            </a:r>
-            <a:r>
-              <a:rPr lang="en-US" dirty="0" smtClean="0">
-                <a:hlinkClick r:id="rId2"/>
-              </a:rPr>
-              <a:t>/</a:t>
-            </a:r>
-            <a:endParaRPr lang="en-US" dirty="0" smtClean="0"/>
-          </a:p>
-          <a:p>
             <a:endParaRPr lang="en-US" dirty="0"/>
           </a:p>
           <a:p>

</xml_diff>

<commit_message>
Small Chagnes to PPT
</commit_message>
<xml_diff>
--- a/materials/AngularJS.pptx
+++ b/materials/AngularJS.pptx
@@ -28073,11 +28073,7 @@
             <a:pPr lvl="1"/>
             <a:r>
               <a:rPr lang="en-US" dirty="0" smtClean="0"/>
-              <a:t>Variables prefixed with a “&amp;” </a:t>
-            </a:r>
-            <a:r>
-              <a:rPr lang="en-US" smtClean="0"/>
-              <a:t>are meant to act as function pointers</a:t>
+              <a:t>Variables prefixed with a “&amp;” are meant to act as function pointers</a:t>
             </a:r>
             <a:endParaRPr lang="en-US" dirty="0"/>
           </a:p>
@@ -33781,13 +33777,6 @@
             <a:endParaRPr lang="en-US" dirty="0"/>
           </a:p>
           <a:p>
-            <a:endParaRPr lang="en-US" dirty="0"/>
-          </a:p>
-          <a:p>
-            <a:r>
-              <a:rPr lang="en-US" dirty="0" smtClean="0"/>
-              <a:t>Exercise</a:t>
-            </a:r>
             <a:endParaRPr lang="en-US" dirty="0"/>
           </a:p>
           <a:p>

</xml_diff>

<commit_message>
Last of PPT Changes
</commit_message>
<xml_diff>
--- a/materials/AngularJS.pptx
+++ b/materials/AngularJS.pptx
@@ -70,7 +70,7 @@
     <p:sldId id="311" r:id="rId58"/>
     <p:sldId id="312" r:id="rId59"/>
     <p:sldId id="313" r:id="rId60"/>
-    <p:sldId id="509" r:id="rId61"/>
+    <p:sldId id="514" r:id="rId61"/>
     <p:sldId id="314" r:id="rId62"/>
     <p:sldId id="315" r:id="rId63"/>
     <p:sldId id="316" r:id="rId64"/>
@@ -46044,7 +46044,7 @@
           <a:p>
             <a:r>
               <a:rPr lang="en-US" dirty="0" smtClean="0"/>
-              <a:t>Karma’s Configuration</a:t>
+              <a:t>Configuration</a:t>
             </a:r>
             <a:endParaRPr lang="en-US" dirty="0"/>
           </a:p>
@@ -46067,9 +46067,69 @@
           <a:p>
             <a:r>
               <a:rPr lang="en-US" dirty="0" smtClean="0"/>
-              <a:t> </a:t>
-            </a:r>
-            <a:endParaRPr lang="en-US" dirty="0"/>
+              <a:t>Like with most things we’re going to need to understand karma’s configuration a bit so that we know how to run our tests</a:t>
+            </a:r>
+          </a:p>
+          <a:p>
+            <a:r>
+              <a:rPr lang="en-US" dirty="0" smtClean="0"/>
+              <a:t>The configuration itself is the export of an object that has certain properties:</a:t>
+            </a:r>
+          </a:p>
+          <a:p>
+            <a:pPr lvl="1"/>
+            <a:r>
+              <a:rPr lang="en-US" b="1" dirty="0" smtClean="0"/>
+              <a:t>files</a:t>
+            </a:r>
+            <a:r>
+              <a:rPr lang="en-US" dirty="0" smtClean="0"/>
+              <a:t> – An array with file path’s relative to the configuration of all tests and dependencies</a:t>
+            </a:r>
+          </a:p>
+          <a:p>
+            <a:pPr lvl="1"/>
+            <a:r>
+              <a:rPr lang="en-US" b="1" dirty="0" smtClean="0"/>
+              <a:t>browsers – </a:t>
+            </a:r>
+            <a:r>
+              <a:rPr lang="en-US" dirty="0" smtClean="0"/>
+              <a:t>Which browsers should be used to execute the tests</a:t>
+            </a:r>
+          </a:p>
+          <a:p>
+            <a:pPr lvl="1"/>
+            <a:r>
+              <a:rPr lang="en-US" b="1" dirty="0" smtClean="0"/>
+              <a:t>preprocessors – </a:t>
+            </a:r>
+            <a:r>
+              <a:rPr lang="en-US" dirty="0" smtClean="0"/>
+              <a:t>Any files that should run before the start of the tests</a:t>
+            </a:r>
+          </a:p>
+          <a:p>
+            <a:pPr lvl="1"/>
+            <a:r>
+              <a:rPr lang="en-US" b="1" dirty="0" smtClean="0"/>
+              <a:t>frameworks  - </a:t>
+            </a:r>
+            <a:r>
+              <a:rPr lang="en-US" dirty="0" smtClean="0"/>
+              <a:t>An array of frameworks that should be included</a:t>
+            </a:r>
+          </a:p>
+          <a:p>
+            <a:pPr lvl="2"/>
+            <a:r>
+              <a:rPr lang="en-US" dirty="0" smtClean="0"/>
+              <a:t>Typically this will be limited to just your testing framework i.e. Jasmine</a:t>
+            </a:r>
+          </a:p>
+          <a:p>
+            <a:pPr lvl="1"/>
+            <a:endParaRPr lang="en-US" b="1" dirty="0"/>
           </a:p>
         </p:txBody>
       </p:sp>
@@ -46099,20 +46159,13 @@
     </p:spTree>
     <p:extLst>
       <p:ext uri="{BB962C8B-B14F-4D97-AF65-F5344CB8AC3E}">
-        <p14:creationId xmlns:p14="http://schemas.microsoft.com/office/powerpoint/2010/main" val="1815366463"/>
+        <p14:creationId xmlns:p14="http://schemas.microsoft.com/office/powerpoint/2010/main" val="1892799829"/>
       </p:ext>
     </p:extLst>
   </p:cSld>
   <p:clrMapOvr>
     <a:masterClrMapping/>
   </p:clrMapOvr>
-  <p:timing>
-    <p:tnLst>
-      <p:par>
-        <p:cTn id="1" dur="indefinite" restart="never" nodeType="tmRoot"/>
-      </p:par>
-    </p:tnLst>
-  </p:timing>
 </p:sld>
 </file>
 

</xml_diff>